<commit_message>
Info final de testing
</commit_message>
<xml_diff>
--- a/tests/testing PPT.pptx
+++ b/tests/testing PPT.pptx
@@ -5,22 +5,23 @@
     <p:sldMasterId id="2147483683" r:id="rId1"/>
   </p:sldMasterIdLst>
   <p:notesMasterIdLst>
-    <p:notesMasterId r:id="rId4"/>
+    <p:notesMasterId r:id="rId5"/>
   </p:notesMasterIdLst>
   <p:sldIdLst>
-    <p:sldId id="304" r:id="rId2"/>
-    <p:sldId id="306" r:id="rId3"/>
+    <p:sldId id="307" r:id="rId2"/>
+    <p:sldId id="304" r:id="rId3"/>
+    <p:sldId id="309" r:id="rId4"/>
   </p:sldIdLst>
   <p:sldSz cx="9144000" cy="5143500" type="screen16x9"/>
   <p:notesSz cx="6858000" cy="9144000"/>
   <p:embeddedFontLst>
     <p:embeddedFont>
       <p:font typeface="Bellefair" panose="020B0604020202020204" charset="-79"/>
-      <p:regular r:id="rId5"/>
+      <p:regular r:id="rId6"/>
     </p:embeddedFont>
     <p:embeddedFont>
       <p:font typeface="Alice" panose="020B0604020202020204" charset="0"/>
-      <p:regular r:id="rId6"/>
+      <p:regular r:id="rId7"/>
     </p:embeddedFont>
   </p:embeddedFontLst>
   <p:defaultTextStyle>
@@ -811,7 +812,7 @@
     </p:spTree>
     <p:extLst>
       <p:ext uri="{BB962C8B-B14F-4D97-AF65-F5344CB8AC3E}">
-        <p14:creationId xmlns:p14="http://schemas.microsoft.com/office/powerpoint/2010/main" val="1223844535"/>
+        <p14:creationId xmlns:p14="http://schemas.microsoft.com/office/powerpoint/2010/main" val="3195145736"/>
       </p:ext>
     </p:extLst>
   </p:cSld>
@@ -920,7 +921,116 @@
     </p:spTree>
     <p:extLst>
       <p:ext uri="{BB962C8B-B14F-4D97-AF65-F5344CB8AC3E}">
-        <p14:creationId xmlns:p14="http://schemas.microsoft.com/office/powerpoint/2010/main" val="1132129958"/>
+        <p14:creationId xmlns:p14="http://schemas.microsoft.com/office/powerpoint/2010/main" val="1223844535"/>
+      </p:ext>
+    </p:extLst>
+  </p:cSld>
+  <p:clrMapOvr>
+    <a:masterClrMapping/>
+  </p:clrMapOvr>
+</p:notes>
+</file>
+
+<file path=ppt/notesSlides/notesSlide3.xml><?xml version="1.0" encoding="utf-8"?>
+<p:notes xmlns:a="http://schemas.openxmlformats.org/drawingml/2006/main" xmlns:r="http://schemas.openxmlformats.org/officeDocument/2006/relationships" xmlns:p="http://schemas.openxmlformats.org/presentationml/2006/main" showMasterSp="0" showMasterPhAnim="0">
+  <p:cSld>
+    <p:spTree>
+      <p:nvGrpSpPr>
+        <p:cNvPr id="1" name="Shape 282"/>
+        <p:cNvGrpSpPr/>
+        <p:nvPr/>
+      </p:nvGrpSpPr>
+      <p:grpSpPr>
+        <a:xfrm>
+          <a:off x="0" y="0"/>
+          <a:ext cx="0" cy="0"/>
+          <a:chOff x="0" y="0"/>
+          <a:chExt cx="0" cy="0"/>
+        </a:xfrm>
+      </p:grpSpPr>
+      <p:sp>
+        <p:nvSpPr>
+          <p:cNvPr id="283" name="Google Shape;283;g10ad28241b8_0_1:notes"/>
+          <p:cNvSpPr>
+            <a:spLocks noGrp="1" noRot="1" noChangeAspect="1"/>
+          </p:cNvSpPr>
+          <p:nvPr>
+            <p:ph type="sldImg" idx="2"/>
+          </p:nvPr>
+        </p:nvSpPr>
+        <p:spPr>
+          <a:xfrm>
+            <a:off x="381000" y="685800"/>
+            <a:ext cx="6096000" cy="3429000"/>
+          </a:xfrm>
+          <a:custGeom>
+            <a:avLst/>
+            <a:gdLst/>
+            <a:ahLst/>
+            <a:cxnLst/>
+            <a:rect l="l" t="t" r="r" b="b"/>
+            <a:pathLst>
+              <a:path w="120000" h="120000" extrusionOk="0">
+                <a:moveTo>
+                  <a:pt x="0" y="0"/>
+                </a:moveTo>
+                <a:lnTo>
+                  <a:pt x="120000" y="0"/>
+                </a:lnTo>
+                <a:lnTo>
+                  <a:pt x="120000" y="120000"/>
+                </a:lnTo>
+                <a:lnTo>
+                  <a:pt x="0" y="120000"/>
+                </a:lnTo>
+                <a:close/>
+              </a:path>
+            </a:pathLst>
+          </a:custGeom>
+        </p:spPr>
+      </p:sp>
+      <p:sp>
+        <p:nvSpPr>
+          <p:cNvPr id="284" name="Google Shape;284;g10ad28241b8_0_1:notes"/>
+          <p:cNvSpPr txBox="1">
+            <a:spLocks noGrp="1"/>
+          </p:cNvSpPr>
+          <p:nvPr>
+            <p:ph type="body" idx="1"/>
+          </p:nvPr>
+        </p:nvSpPr>
+        <p:spPr>
+          <a:xfrm>
+            <a:off x="685800" y="4343400"/>
+            <a:ext cx="5486400" cy="4114800"/>
+          </a:xfrm>
+          <a:prstGeom prst="rect">
+            <a:avLst/>
+          </a:prstGeom>
+        </p:spPr>
+        <p:txBody>
+          <a:bodyPr spcFirstLastPara="1" wrap="square" lIns="91425" tIns="91425" rIns="91425" bIns="91425" anchor="t" anchorCtr="0">
+            <a:noAutofit/>
+          </a:bodyPr>
+          <a:lstStyle/>
+          <a:p>
+            <a:pPr marL="0" lvl="0" indent="0" algn="l" rtl="0">
+              <a:spcBef>
+                <a:spcPts val="0"/>
+              </a:spcBef>
+              <a:spcAft>
+                <a:spcPts val="0"/>
+              </a:spcAft>
+              <a:buNone/>
+            </a:pPr>
+            <a:endParaRPr/>
+          </a:p>
+        </p:txBody>
+      </p:sp>
+    </p:spTree>
+    <p:extLst>
+      <p:ext uri="{BB962C8B-B14F-4D97-AF65-F5344CB8AC3E}">
+        <p14:creationId xmlns:p14="http://schemas.microsoft.com/office/powerpoint/2010/main" val="2225823136"/>
       </p:ext>
     </p:extLst>
   </p:cSld>
@@ -1298,37 +1408,6 @@
 </file>
 
 <file path=ppt/slideLayouts/slideLayout2.xml><?xml version="1.0" encoding="utf-8"?>
-<p:sldLayout xmlns:a="http://schemas.openxmlformats.org/drawingml/2006/main" xmlns:r="http://schemas.openxmlformats.org/officeDocument/2006/relationships" xmlns:p="http://schemas.openxmlformats.org/presentationml/2006/main" matchingName="Blank" type="blank">
-  <p:cSld name="BLANK">
-    <p:bg>
-      <p:bgPr>
-        <a:noFill/>
-        <a:effectLst/>
-      </p:bgPr>
-    </p:bg>
-    <p:spTree>
-      <p:nvGrpSpPr>
-        <p:cNvPr id="1" name="Shape 68"/>
-        <p:cNvGrpSpPr/>
-        <p:nvPr/>
-      </p:nvGrpSpPr>
-      <p:grpSpPr>
-        <a:xfrm>
-          <a:off x="0" y="0"/>
-          <a:ext cx="0" cy="0"/>
-          <a:chOff x="0" y="0"/>
-          <a:chExt cx="0" cy="0"/>
-        </a:xfrm>
-      </p:grpSpPr>
-    </p:spTree>
-  </p:cSld>
-  <p:clrMapOvr>
-    <a:masterClrMapping/>
-  </p:clrMapOvr>
-</p:sldLayout>
-</file>
-
-<file path=ppt/slideLayouts/slideLayout3.xml><?xml version="1.0" encoding="utf-8"?>
 <p:sldLayout xmlns:a="http://schemas.openxmlformats.org/drawingml/2006/main" xmlns:r="http://schemas.openxmlformats.org/officeDocument/2006/relationships" xmlns:p="http://schemas.openxmlformats.org/presentationml/2006/main" matchingName="Background">
   <p:cSld name="CUSTOM_5">
     <p:spTree>
@@ -1437,7 +1516,7 @@
 </p:sldLayout>
 </file>
 
-<file path=ppt/slideLayouts/slideLayout4.xml><?xml version="1.0" encoding="utf-8"?>
+<file path=ppt/slideLayouts/slideLayout3.xml><?xml version="1.0" encoding="utf-8"?>
 <p:sldLayout xmlns:a="http://schemas.openxmlformats.org/drawingml/2006/main" xmlns:r="http://schemas.openxmlformats.org/officeDocument/2006/relationships" xmlns:p="http://schemas.openxmlformats.org/presentationml/2006/main" matchingName="Background 1">
   <p:cSld name="CUSTOM_5_1">
     <p:spTree>
@@ -1545,7 +1624,7 @@
 </p:sldLayout>
 </file>
 
-<file path=ppt/slideLayouts/slideLayout5.xml><?xml version="1.0" encoding="utf-8"?>
+<file path=ppt/slideLayouts/slideLayout4.xml><?xml version="1.0" encoding="utf-8"?>
 <p:sldLayout xmlns:a="http://schemas.openxmlformats.org/drawingml/2006/main" xmlns:r="http://schemas.openxmlformats.org/officeDocument/2006/relationships" xmlns:p="http://schemas.openxmlformats.org/presentationml/2006/main" matchingName="Background 2">
   <p:cSld name="CUSTOM_5_1_1">
     <p:spTree>
@@ -1653,7 +1732,7 @@
 </p:sldLayout>
 </file>
 
-<file path=ppt/slideLayouts/slideLayout6.xml><?xml version="1.0" encoding="utf-8"?>
+<file path=ppt/slideLayouts/slideLayout5.xml><?xml version="1.0" encoding="utf-8"?>
 <p:sldLayout xmlns:a="http://schemas.openxmlformats.org/drawingml/2006/main" xmlns:r="http://schemas.openxmlformats.org/officeDocument/2006/relationships" xmlns:p="http://schemas.openxmlformats.org/presentationml/2006/main" matchingName="Background 3">
   <p:cSld name="CUSTOM_5_1_1_1">
     <p:spTree>
@@ -2300,11 +2379,10 @@
   <p:clrMap bg1="lt1" tx1="dk1" bg2="dk2" tx2="lt2" accent1="accent1" accent2="accent2" accent3="accent3" accent4="accent4" accent5="accent5" accent6="accent6" hlink="hlink" folHlink="folHlink"/>
   <p:sldLayoutIdLst>
     <p:sldLayoutId id="2147483650" r:id="rId1"/>
-    <p:sldLayoutId id="2147483658" r:id="rId2"/>
-    <p:sldLayoutId id="2147483677" r:id="rId3"/>
-    <p:sldLayoutId id="2147483678" r:id="rId4"/>
-    <p:sldLayoutId id="2147483679" r:id="rId5"/>
-    <p:sldLayoutId id="2147483680" r:id="rId6"/>
+    <p:sldLayoutId id="2147483677" r:id="rId2"/>
+    <p:sldLayoutId id="2147483678" r:id="rId3"/>
+    <p:sldLayoutId id="2147483679" r:id="rId4"/>
+    <p:sldLayoutId id="2147483680" r:id="rId5"/>
   </p:sldLayoutIdLst>
   <p:hf sldNum="0" hdr="0" ftr="0" dt="0"/>
   <p:txStyles>
@@ -3041,7 +3119,7 @@
           </a:bodyPr>
           <a:lstStyle/>
           <a:p>
-            <a:pPr marL="0" lvl="0" indent="0" algn="l" rtl="0">
+            <a:pPr marL="0" lvl="0" indent="0" algn="ctr" rtl="0">
               <a:spcBef>
                 <a:spcPts val="0"/>
               </a:spcBef>
@@ -3057,7 +3135,15 @@
             </a:pPr>
             <a:r>
               <a:rPr lang="es-AR" dirty="0" smtClean="0"/>
-              <a:t>Planificación de test</a:t>
+              <a:t>Estrategia de </a:t>
+            </a:r>
+            <a:r>
+              <a:rPr lang="es-AR" dirty="0" err="1"/>
+              <a:t>T</a:t>
+            </a:r>
+            <a:r>
+              <a:rPr lang="es-AR" dirty="0" err="1" smtClean="0"/>
+              <a:t>esting</a:t>
             </a:r>
             <a:endParaRPr dirty="0"/>
           </a:p>
@@ -3065,14 +3151,14 @@
       </p:sp>
       <p:sp>
         <p:nvSpPr>
-          <p:cNvPr id="2" name="CuadroTexto 1"/>
+          <p:cNvPr id="3" name="CuadroTexto 2"/>
           <p:cNvSpPr txBox="1"/>
           <p:nvPr/>
         </p:nvSpPr>
         <p:spPr>
           <a:xfrm>
-            <a:off x="1975142" y="930011"/>
-            <a:ext cx="1140056" cy="307777"/>
+            <a:off x="789793" y="1012874"/>
+            <a:ext cx="7638757" cy="4247317"/>
           </a:xfrm>
           <a:prstGeom prst="rect">
             <a:avLst/>
@@ -3080,217 +3166,246 @@
           <a:noFill/>
         </p:spPr>
         <p:txBody>
-          <a:bodyPr wrap="none" rtlCol="0">
+          <a:bodyPr wrap="square" rtlCol="0">
             <a:spAutoFit/>
           </a:bodyPr>
           <a:lstStyle/>
           <a:p>
             <a:r>
+              <a:rPr lang="es-ES" sz="1800" dirty="0"/>
+              <a:t>En cada Sprint</a:t>
+            </a:r>
+            <a:r>
+              <a:rPr lang="es-ES" dirty="0" smtClean="0"/>
+              <a:t>:</a:t>
+            </a:r>
+          </a:p>
+          <a:p>
+            <a:endParaRPr lang="en-US" dirty="0"/>
+          </a:p>
+          <a:p>
+            <a:pPr lvl="0"/>
+            <a:r>
+              <a:rPr lang="es-ES" dirty="0" smtClean="0"/>
+              <a:t>- Back- </a:t>
+            </a:r>
+            <a:r>
               <a:rPr lang="es-ES" dirty="0" err="1" smtClean="0"/>
+              <a:t>end</a:t>
+            </a:r>
+            <a:r>
+              <a:rPr lang="es-ES" dirty="0" smtClean="0"/>
+              <a:t> : realizamos </a:t>
+            </a:r>
+            <a:r>
+              <a:rPr lang="es-ES" dirty="0"/>
+              <a:t>testeos sobre los </a:t>
+            </a:r>
+            <a:r>
+              <a:rPr lang="es-ES" dirty="0" err="1"/>
+              <a:t>Controller</a:t>
+            </a:r>
+            <a:r>
+              <a:rPr lang="es-ES" dirty="0"/>
+              <a:t> y </a:t>
+            </a:r>
+            <a:r>
+              <a:rPr lang="es-ES" dirty="0" err="1"/>
+              <a:t>Service</a:t>
+            </a:r>
+            <a:r>
+              <a:rPr lang="es-ES" dirty="0"/>
+              <a:t> desarrollados</a:t>
+            </a:r>
+            <a:r>
+              <a:rPr lang="es-ES" dirty="0" smtClean="0"/>
+              <a:t>.</a:t>
+            </a:r>
+          </a:p>
+          <a:p>
+            <a:pPr lvl="0"/>
+            <a:endParaRPr lang="en-US" dirty="0"/>
+          </a:p>
+          <a:p>
+            <a:pPr lvl="0"/>
+            <a:r>
+              <a:rPr lang="es-ES" dirty="0" smtClean="0"/>
+              <a:t>- </a:t>
+            </a:r>
+            <a:r>
+              <a:rPr lang="es-ES" dirty="0" err="1" smtClean="0"/>
+              <a:t>Postman</a:t>
+            </a:r>
+            <a:r>
+              <a:rPr lang="es-ES" dirty="0" smtClean="0"/>
+              <a:t> : Generamos y corremos </a:t>
+            </a:r>
+            <a:r>
+              <a:rPr lang="es-ES" dirty="0"/>
+              <a:t>los scripts </a:t>
+            </a:r>
+            <a:r>
+              <a:rPr lang="es-ES" dirty="0" smtClean="0"/>
+              <a:t>para </a:t>
+            </a:r>
+            <a:r>
+              <a:rPr lang="es-ES" dirty="0"/>
+              <a:t>testear los </a:t>
+            </a:r>
+            <a:r>
+              <a:rPr lang="es-ES" dirty="0" err="1"/>
+              <a:t>endpoints</a:t>
+            </a:r>
+            <a:r>
+              <a:rPr lang="es-ES" dirty="0"/>
+              <a:t> creados.</a:t>
+            </a:r>
+            <a:endParaRPr lang="en-US" dirty="0"/>
+          </a:p>
+          <a:p>
+            <a:pPr lvl="0"/>
+            <a:endParaRPr lang="es-ES" dirty="0" smtClean="0"/>
+          </a:p>
+          <a:p>
+            <a:pPr lvl="0"/>
+            <a:r>
+              <a:rPr lang="es-ES" dirty="0" smtClean="0"/>
+              <a:t>- Generamos casos </a:t>
+            </a:r>
+            <a:r>
+              <a:rPr lang="es-ES" dirty="0"/>
+              <a:t>de prueba (positivos y negativos) </a:t>
+            </a:r>
+            <a:r>
+              <a:rPr lang="es-ES" dirty="0" smtClean="0"/>
+              <a:t>en base a las </a:t>
+            </a:r>
+            <a:r>
+              <a:rPr lang="es-ES" dirty="0"/>
+              <a:t>historias de usuarios.</a:t>
+            </a:r>
+            <a:endParaRPr lang="en-US" dirty="0"/>
+          </a:p>
+          <a:p>
+            <a:pPr lvl="0"/>
+            <a:endParaRPr lang="es-ES" dirty="0" smtClean="0"/>
+          </a:p>
+          <a:p>
+            <a:pPr lvl="0"/>
+            <a:r>
+              <a:rPr lang="es-ES" dirty="0" smtClean="0"/>
+              <a:t>- Generamos </a:t>
+            </a:r>
+            <a:r>
+              <a:rPr lang="es-ES" dirty="0"/>
+              <a:t>un ciclo de testeos </a:t>
+            </a:r>
+            <a:r>
+              <a:rPr lang="es-ES" dirty="0" smtClean="0"/>
+              <a:t>con </a:t>
+            </a:r>
+            <a:r>
+              <a:rPr lang="es-ES" dirty="0"/>
+              <a:t>nuevas pruebas (</a:t>
+            </a:r>
+            <a:r>
+              <a:rPr lang="es-ES" dirty="0" err="1"/>
               <a:t>Smoke</a:t>
             </a:r>
             <a:r>
+              <a:rPr lang="es-ES" dirty="0"/>
+              <a:t>), la repetición de las pruebas </a:t>
+            </a:r>
+            <a:r>
               <a:rPr lang="es-ES" dirty="0" smtClean="0"/>
-              <a:t> Test</a:t>
-            </a:r>
+              <a:t>fallidas </a:t>
+            </a:r>
+            <a:r>
+              <a:rPr lang="es-ES" dirty="0"/>
+              <a:t>anteriormente (regresión) y/o la repetición de pruebas por modificaciones de funcionalidades (regresión). </a:t>
+            </a:r>
+            <a:endParaRPr lang="es-ES" dirty="0" smtClean="0"/>
+          </a:p>
+          <a:p>
+            <a:pPr lvl="0"/>
+            <a:endParaRPr lang="es-ES" dirty="0" smtClean="0"/>
+          </a:p>
+          <a:p>
+            <a:pPr lvl="0"/>
+            <a:r>
+              <a:rPr lang="es-ES" dirty="0" smtClean="0"/>
+              <a:t>- Corremos el </a:t>
+            </a:r>
+            <a:r>
+              <a:rPr lang="es-ES" dirty="0"/>
+              <a:t>ciclo, se reflejan los </a:t>
+            </a:r>
+            <a:r>
+              <a:rPr lang="es-ES" dirty="0" smtClean="0"/>
+              <a:t>resultados</a:t>
+            </a:r>
+          </a:p>
+          <a:p>
+            <a:pPr lvl="0"/>
+            <a:endParaRPr lang="es-ES" dirty="0" smtClean="0"/>
+          </a:p>
+          <a:p>
+            <a:pPr lvl="0"/>
+            <a:r>
+              <a:rPr lang="es-ES" dirty="0" smtClean="0"/>
+              <a:t>- Creamos y corremos </a:t>
+            </a:r>
+            <a:r>
+              <a:rPr lang="es-ES" dirty="0"/>
+              <a:t>en </a:t>
+            </a:r>
+            <a:r>
+              <a:rPr lang="es-ES" dirty="0" err="1"/>
+              <a:t>Selenium</a:t>
+            </a:r>
+            <a:r>
+              <a:rPr lang="es-ES" dirty="0"/>
+              <a:t> pruebas sobre los desarrollos del sprint</a:t>
+            </a:r>
+            <a:r>
+              <a:rPr lang="es-ES" dirty="0" smtClean="0"/>
+              <a:t>.</a:t>
+            </a:r>
+          </a:p>
+          <a:p>
+            <a:endParaRPr lang="es-ES" dirty="0" smtClean="0"/>
+          </a:p>
+          <a:p>
+            <a:r>
+              <a:rPr lang="es-ES" dirty="0" smtClean="0"/>
+              <a:t>- Se </a:t>
+            </a:r>
+            <a:r>
+              <a:rPr lang="es-ES" dirty="0"/>
+              <a:t>retroalimenta al equipo de desarrollo.</a:t>
+            </a:r>
+            <a:endParaRPr lang="en-US" dirty="0"/>
+          </a:p>
+          <a:p>
+            <a:pPr marL="285750" lvl="0" indent="-285750">
+              <a:buFontTx/>
+              <a:buChar char="-"/>
+            </a:pPr>
+            <a:endParaRPr lang="es-ES" dirty="0"/>
+          </a:p>
+          <a:p>
+            <a:pPr marL="285750" lvl="0" indent="-285750">
+              <a:buFontTx/>
+              <a:buChar char="-"/>
+            </a:pPr>
             <a:endParaRPr lang="en-US" dirty="0"/>
           </a:p>
         </p:txBody>
       </p:sp>
-      <p:pic>
-        <p:nvPicPr>
-          <p:cNvPr id="3" name="Imagen 2"/>
-          <p:cNvPicPr>
-            <a:picLocks noChangeAspect="1"/>
-          </p:cNvPicPr>
-          <p:nvPr/>
-        </p:nvPicPr>
-        <p:blipFill>
-          <a:blip r:embed="rId3"/>
-          <a:stretch>
-            <a:fillRect/>
-          </a:stretch>
-        </p:blipFill>
-        <p:spPr>
-          <a:xfrm>
-            <a:off x="560805" y="1388755"/>
-            <a:ext cx="4140425" cy="1424782"/>
-          </a:xfrm>
-          <a:prstGeom prst="rect">
-            <a:avLst/>
-          </a:prstGeom>
-        </p:spPr>
-      </p:pic>
-      <p:sp>
-        <p:nvSpPr>
-          <p:cNvPr id="6" name="CuadroTexto 5"/>
-          <p:cNvSpPr txBox="1"/>
-          <p:nvPr/>
-        </p:nvSpPr>
-        <p:spPr>
-          <a:xfrm>
-            <a:off x="5840334" y="987663"/>
-            <a:ext cx="1766830" cy="307777"/>
-          </a:xfrm>
-          <a:prstGeom prst="rect">
-            <a:avLst/>
-          </a:prstGeom>
-          <a:noFill/>
-        </p:spPr>
-        <p:txBody>
-          <a:bodyPr wrap="none" rtlCol="0">
-            <a:spAutoFit/>
-          </a:bodyPr>
-          <a:lstStyle/>
-          <a:p>
-            <a:r>
-              <a:rPr lang="es-ES" dirty="0" smtClean="0"/>
-              <a:t>Prueba Exploratoria</a:t>
-            </a:r>
-            <a:endParaRPr lang="en-US" dirty="0"/>
-          </a:p>
-        </p:txBody>
-      </p:sp>
-      <p:pic>
-        <p:nvPicPr>
-          <p:cNvPr id="4" name="Imagen 3"/>
-          <p:cNvPicPr>
-            <a:picLocks noChangeAspect="1"/>
-          </p:cNvPicPr>
-          <p:nvPr/>
-        </p:nvPicPr>
-        <p:blipFill>
-          <a:blip r:embed="rId4"/>
-          <a:stretch>
-            <a:fillRect/>
-          </a:stretch>
-        </p:blipFill>
-        <p:spPr>
-          <a:xfrm>
-            <a:off x="5018949" y="1388752"/>
-            <a:ext cx="3409601" cy="1424785"/>
-          </a:xfrm>
-          <a:prstGeom prst="rect">
-            <a:avLst/>
-          </a:prstGeom>
-        </p:spPr>
-      </p:pic>
-      <p:sp>
-        <p:nvSpPr>
-          <p:cNvPr id="8" name="CuadroTexto 7"/>
-          <p:cNvSpPr txBox="1"/>
-          <p:nvPr/>
-        </p:nvSpPr>
-        <p:spPr>
-          <a:xfrm>
-            <a:off x="1716257" y="2951208"/>
-            <a:ext cx="1657826" cy="307777"/>
-          </a:xfrm>
-          <a:prstGeom prst="rect">
-            <a:avLst/>
-          </a:prstGeom>
-          <a:noFill/>
-        </p:spPr>
-        <p:txBody>
-          <a:bodyPr wrap="none" rtlCol="0">
-            <a:spAutoFit/>
-          </a:bodyPr>
-          <a:lstStyle/>
-          <a:p>
-            <a:r>
-              <a:rPr lang="es-ES" dirty="0" smtClean="0"/>
-              <a:t>Pruebas Unitarias</a:t>
-            </a:r>
-            <a:endParaRPr lang="en-US" dirty="0"/>
-          </a:p>
-        </p:txBody>
-      </p:sp>
-      <p:sp>
-        <p:nvSpPr>
-          <p:cNvPr id="9" name="CuadroTexto 8"/>
-          <p:cNvSpPr txBox="1"/>
-          <p:nvPr/>
-        </p:nvSpPr>
-        <p:spPr>
-          <a:xfrm>
-            <a:off x="5840334" y="2951208"/>
-            <a:ext cx="1577676" cy="307777"/>
-          </a:xfrm>
-          <a:prstGeom prst="rect">
-            <a:avLst/>
-          </a:prstGeom>
-          <a:noFill/>
-        </p:spPr>
-        <p:txBody>
-          <a:bodyPr wrap="none" rtlCol="0">
-            <a:spAutoFit/>
-          </a:bodyPr>
-          <a:lstStyle/>
-          <a:p>
-            <a:r>
-              <a:rPr lang="es-ES" dirty="0" smtClean="0"/>
-              <a:t>Testeos </a:t>
-            </a:r>
-            <a:r>
-              <a:rPr lang="es-ES" dirty="0" err="1" smtClean="0"/>
-              <a:t>Postman</a:t>
-            </a:r>
-            <a:endParaRPr lang="en-US" dirty="0"/>
-          </a:p>
-        </p:txBody>
-      </p:sp>
-      <p:pic>
-        <p:nvPicPr>
-          <p:cNvPr id="5" name="Imagen 4"/>
-          <p:cNvPicPr>
-            <a:picLocks noChangeAspect="1"/>
-          </p:cNvPicPr>
-          <p:nvPr/>
-        </p:nvPicPr>
-        <p:blipFill>
-          <a:blip r:embed="rId5"/>
-          <a:stretch>
-            <a:fillRect/>
-          </a:stretch>
-        </p:blipFill>
-        <p:spPr>
-          <a:xfrm>
-            <a:off x="5053067" y="3396656"/>
-            <a:ext cx="3341364" cy="1080335"/>
-          </a:xfrm>
-          <a:prstGeom prst="rect">
-            <a:avLst/>
-          </a:prstGeom>
-        </p:spPr>
-      </p:pic>
-      <p:pic>
-        <p:nvPicPr>
-          <p:cNvPr id="7" name="Imagen 6"/>
-          <p:cNvPicPr>
-            <a:picLocks noChangeAspect="1"/>
-          </p:cNvPicPr>
-          <p:nvPr/>
-        </p:nvPicPr>
-        <p:blipFill>
-          <a:blip r:embed="rId6"/>
-          <a:stretch>
-            <a:fillRect/>
-          </a:stretch>
-        </p:blipFill>
-        <p:spPr>
-          <a:xfrm>
-            <a:off x="926565" y="3332788"/>
-            <a:ext cx="3195269" cy="1609296"/>
-          </a:xfrm>
-          <a:prstGeom prst="rect">
-            <a:avLst/>
-          </a:prstGeom>
-        </p:spPr>
-      </p:pic>
     </p:spTree>
     <p:extLst>
       <p:ext uri="{BB962C8B-B14F-4D97-AF65-F5344CB8AC3E}">
-        <p14:creationId xmlns:p14="http://schemas.microsoft.com/office/powerpoint/2010/main" val="2628293811"/>
+        <p14:creationId xmlns:p14="http://schemas.microsoft.com/office/powerpoint/2010/main" val="755846022"/>
       </p:ext>
     </p:extLst>
   </p:cSld>
@@ -3336,6 +3451,368 @@
         </p:nvSpPr>
         <p:spPr>
           <a:xfrm>
+            <a:off x="433532" y="309991"/>
+            <a:ext cx="7713000" cy="356100"/>
+          </a:xfrm>
+          <a:prstGeom prst="rect">
+            <a:avLst/>
+          </a:prstGeom>
+        </p:spPr>
+        <p:txBody>
+          <a:bodyPr spcFirstLastPara="1" wrap="square" lIns="91425" tIns="91425" rIns="91425" bIns="91425" anchor="ctr" anchorCtr="0">
+            <a:noAutofit/>
+          </a:bodyPr>
+          <a:lstStyle/>
+          <a:p>
+            <a:pPr marL="0" lvl="0" indent="0" algn="ctr" rtl="0">
+              <a:spcBef>
+                <a:spcPts val="0"/>
+              </a:spcBef>
+              <a:spcAft>
+                <a:spcPts val="0"/>
+              </a:spcAft>
+              <a:buClr>
+                <a:schemeClr val="dk1"/>
+              </a:buClr>
+              <a:buSzPts val="1100"/>
+              <a:buFont typeface="Arial"/>
+              <a:buNone/>
+            </a:pPr>
+            <a:r>
+              <a:rPr lang="es-AR" dirty="0" smtClean="0"/>
+              <a:t>Planificación de test</a:t>
+            </a:r>
+            <a:endParaRPr dirty="0"/>
+          </a:p>
+        </p:txBody>
+      </p:sp>
+      <p:sp>
+        <p:nvSpPr>
+          <p:cNvPr id="2" name="CuadroTexto 1"/>
+          <p:cNvSpPr txBox="1"/>
+          <p:nvPr/>
+        </p:nvSpPr>
+        <p:spPr>
+          <a:xfrm>
+            <a:off x="1384143" y="971273"/>
+            <a:ext cx="1140056" cy="307777"/>
+          </a:xfrm>
+          <a:prstGeom prst="rect">
+            <a:avLst/>
+          </a:prstGeom>
+          <a:noFill/>
+        </p:spPr>
+        <p:txBody>
+          <a:bodyPr wrap="none" rtlCol="0">
+            <a:spAutoFit/>
+          </a:bodyPr>
+          <a:lstStyle/>
+          <a:p>
+            <a:r>
+              <a:rPr lang="es-ES" dirty="0" err="1" smtClean="0"/>
+              <a:t>Smoke</a:t>
+            </a:r>
+            <a:r>
+              <a:rPr lang="es-ES" dirty="0" smtClean="0"/>
+              <a:t> Test</a:t>
+            </a:r>
+            <a:endParaRPr lang="en-US" dirty="0"/>
+          </a:p>
+        </p:txBody>
+      </p:sp>
+      <p:pic>
+        <p:nvPicPr>
+          <p:cNvPr id="3" name="Imagen 2"/>
+          <p:cNvPicPr>
+            <a:picLocks noChangeAspect="1"/>
+          </p:cNvPicPr>
+          <p:nvPr/>
+        </p:nvPicPr>
+        <p:blipFill>
+          <a:blip r:embed="rId3"/>
+          <a:stretch>
+            <a:fillRect/>
+          </a:stretch>
+        </p:blipFill>
+        <p:spPr>
+          <a:xfrm>
+            <a:off x="236961" y="1421271"/>
+            <a:ext cx="3026744" cy="1255656"/>
+          </a:xfrm>
+          <a:prstGeom prst="rect">
+            <a:avLst/>
+          </a:prstGeom>
+        </p:spPr>
+      </p:pic>
+      <p:sp>
+        <p:nvSpPr>
+          <p:cNvPr id="6" name="CuadroTexto 5"/>
+          <p:cNvSpPr txBox="1"/>
+          <p:nvPr/>
+        </p:nvSpPr>
+        <p:spPr>
+          <a:xfrm>
+            <a:off x="6234230" y="971273"/>
+            <a:ext cx="1766830" cy="307777"/>
+          </a:xfrm>
+          <a:prstGeom prst="rect">
+            <a:avLst/>
+          </a:prstGeom>
+          <a:noFill/>
+        </p:spPr>
+        <p:txBody>
+          <a:bodyPr wrap="none" rtlCol="0">
+            <a:spAutoFit/>
+          </a:bodyPr>
+          <a:lstStyle/>
+          <a:p>
+            <a:r>
+              <a:rPr lang="es-ES" dirty="0" smtClean="0"/>
+              <a:t>Prueba Exploratoria</a:t>
+            </a:r>
+            <a:endParaRPr lang="en-US" dirty="0"/>
+          </a:p>
+        </p:txBody>
+      </p:sp>
+      <p:pic>
+        <p:nvPicPr>
+          <p:cNvPr id="4" name="Imagen 3"/>
+          <p:cNvPicPr>
+            <a:picLocks noChangeAspect="1"/>
+          </p:cNvPicPr>
+          <p:nvPr/>
+        </p:nvPicPr>
+        <p:blipFill>
+          <a:blip r:embed="rId4"/>
+          <a:stretch>
+            <a:fillRect/>
+          </a:stretch>
+        </p:blipFill>
+        <p:spPr>
+          <a:xfrm>
+            <a:off x="5876732" y="1423860"/>
+            <a:ext cx="2819103" cy="1178031"/>
+          </a:xfrm>
+          <a:prstGeom prst="rect">
+            <a:avLst/>
+          </a:prstGeom>
+        </p:spPr>
+      </p:pic>
+      <p:sp>
+        <p:nvSpPr>
+          <p:cNvPr id="8" name="CuadroTexto 7"/>
+          <p:cNvSpPr txBox="1"/>
+          <p:nvPr/>
+        </p:nvSpPr>
+        <p:spPr>
+          <a:xfrm>
+            <a:off x="1125258" y="2946658"/>
+            <a:ext cx="1657826" cy="307777"/>
+          </a:xfrm>
+          <a:prstGeom prst="rect">
+            <a:avLst/>
+          </a:prstGeom>
+          <a:noFill/>
+        </p:spPr>
+        <p:txBody>
+          <a:bodyPr wrap="none" rtlCol="0">
+            <a:spAutoFit/>
+          </a:bodyPr>
+          <a:lstStyle/>
+          <a:p>
+            <a:r>
+              <a:rPr lang="es-ES" dirty="0" smtClean="0"/>
+              <a:t>Pruebas Unitarias</a:t>
+            </a:r>
+            <a:endParaRPr lang="en-US" dirty="0"/>
+          </a:p>
+        </p:txBody>
+      </p:sp>
+      <p:sp>
+        <p:nvSpPr>
+          <p:cNvPr id="9" name="CuadroTexto 8"/>
+          <p:cNvSpPr txBox="1"/>
+          <p:nvPr/>
+        </p:nvSpPr>
+        <p:spPr>
+          <a:xfrm>
+            <a:off x="6469483" y="3116618"/>
+            <a:ext cx="1577676" cy="307777"/>
+          </a:xfrm>
+          <a:prstGeom prst="rect">
+            <a:avLst/>
+          </a:prstGeom>
+          <a:noFill/>
+        </p:spPr>
+        <p:txBody>
+          <a:bodyPr wrap="none" rtlCol="0">
+            <a:spAutoFit/>
+          </a:bodyPr>
+          <a:lstStyle/>
+          <a:p>
+            <a:r>
+              <a:rPr lang="es-ES" dirty="0" smtClean="0"/>
+              <a:t>Testeos </a:t>
+            </a:r>
+            <a:r>
+              <a:rPr lang="es-ES" dirty="0" err="1" smtClean="0"/>
+              <a:t>Postman</a:t>
+            </a:r>
+            <a:endParaRPr lang="en-US" dirty="0"/>
+          </a:p>
+        </p:txBody>
+      </p:sp>
+      <p:pic>
+        <p:nvPicPr>
+          <p:cNvPr id="5" name="Imagen 4"/>
+          <p:cNvPicPr>
+            <a:picLocks noChangeAspect="1"/>
+          </p:cNvPicPr>
+          <p:nvPr/>
+        </p:nvPicPr>
+        <p:blipFill>
+          <a:blip r:embed="rId5"/>
+          <a:stretch>
+            <a:fillRect/>
+          </a:stretch>
+        </p:blipFill>
+        <p:spPr>
+          <a:xfrm>
+            <a:off x="5846940" y="3719149"/>
+            <a:ext cx="3034787" cy="981212"/>
+          </a:xfrm>
+          <a:prstGeom prst="rect">
+            <a:avLst/>
+          </a:prstGeom>
+        </p:spPr>
+      </p:pic>
+      <p:pic>
+        <p:nvPicPr>
+          <p:cNvPr id="7" name="Imagen 6"/>
+          <p:cNvPicPr>
+            <a:picLocks noChangeAspect="1"/>
+          </p:cNvPicPr>
+          <p:nvPr/>
+        </p:nvPicPr>
+        <p:blipFill>
+          <a:blip r:embed="rId6"/>
+          <a:stretch>
+            <a:fillRect/>
+          </a:stretch>
+        </p:blipFill>
+        <p:spPr>
+          <a:xfrm>
+            <a:off x="204283" y="3270506"/>
+            <a:ext cx="2997173" cy="1509525"/>
+          </a:xfrm>
+          <a:prstGeom prst="rect">
+            <a:avLst/>
+          </a:prstGeom>
+        </p:spPr>
+      </p:pic>
+      <p:sp>
+        <p:nvSpPr>
+          <p:cNvPr id="11" name="CuadroTexto 10"/>
+          <p:cNvSpPr txBox="1"/>
+          <p:nvPr/>
+        </p:nvSpPr>
+        <p:spPr>
+          <a:xfrm>
+            <a:off x="4104386" y="2049099"/>
+            <a:ext cx="931665" cy="307777"/>
+          </a:xfrm>
+          <a:prstGeom prst="rect">
+            <a:avLst/>
+          </a:prstGeom>
+          <a:noFill/>
+        </p:spPr>
+        <p:txBody>
+          <a:bodyPr wrap="none" rtlCol="0">
+            <a:spAutoFit/>
+          </a:bodyPr>
+          <a:lstStyle/>
+          <a:p>
+            <a:r>
+              <a:rPr lang="es-ES" dirty="0" err="1" smtClean="0"/>
+              <a:t>Selenium</a:t>
+            </a:r>
+            <a:endParaRPr lang="en-US" dirty="0"/>
+          </a:p>
+        </p:txBody>
+      </p:sp>
+      <p:pic>
+        <p:nvPicPr>
+          <p:cNvPr id="10" name="Imagen 9"/>
+          <p:cNvPicPr>
+            <a:picLocks noChangeAspect="1"/>
+          </p:cNvPicPr>
+          <p:nvPr/>
+        </p:nvPicPr>
+        <p:blipFill>
+          <a:blip r:embed="rId7"/>
+          <a:stretch>
+            <a:fillRect/>
+          </a:stretch>
+        </p:blipFill>
+        <p:spPr>
+          <a:xfrm>
+            <a:off x="3168778" y="2397366"/>
+            <a:ext cx="2915010" cy="1281293"/>
+          </a:xfrm>
+          <a:prstGeom prst="rect">
+            <a:avLst/>
+          </a:prstGeom>
+        </p:spPr>
+      </p:pic>
+    </p:spTree>
+    <p:extLst>
+      <p:ext uri="{BB962C8B-B14F-4D97-AF65-F5344CB8AC3E}">
+        <p14:creationId xmlns:p14="http://schemas.microsoft.com/office/powerpoint/2010/main" val="2628293811"/>
+      </p:ext>
+    </p:extLst>
+  </p:cSld>
+  <p:clrMapOvr>
+    <a:masterClrMapping/>
+  </p:clrMapOvr>
+  <p:timing>
+    <p:tnLst>
+      <p:par>
+        <p:cTn id="1" dur="indefinite" restart="never" nodeType="tmRoot"/>
+      </p:par>
+    </p:tnLst>
+  </p:timing>
+</p:sld>
+</file>
+
+<file path=ppt/slides/slide3.xml><?xml version="1.0" encoding="utf-8"?>
+<p:sld xmlns:a="http://schemas.openxmlformats.org/drawingml/2006/main" xmlns:r="http://schemas.openxmlformats.org/officeDocument/2006/relationships" xmlns:p="http://schemas.openxmlformats.org/presentationml/2006/main">
+  <p:cSld>
+    <p:spTree>
+      <p:nvGrpSpPr>
+        <p:cNvPr id="1" name="Shape 285"/>
+        <p:cNvGrpSpPr/>
+        <p:nvPr/>
+      </p:nvGrpSpPr>
+      <p:grpSpPr>
+        <a:xfrm>
+          <a:off x="0" y="0"/>
+          <a:ext cx="0" cy="0"/>
+          <a:chOff x="0" y="0"/>
+          <a:chExt cx="0" cy="0"/>
+        </a:xfrm>
+      </p:grpSpPr>
+      <p:sp>
+        <p:nvSpPr>
+          <p:cNvPr id="287" name="Google Shape;287;p39"/>
+          <p:cNvSpPr txBox="1">
+            <a:spLocks noGrp="1"/>
+          </p:cNvSpPr>
+          <p:nvPr>
+            <p:ph type="title"/>
+          </p:nvPr>
+        </p:nvSpPr>
+        <p:spPr>
+          <a:xfrm>
             <a:off x="715550" y="324436"/>
             <a:ext cx="7713000" cy="356100"/>
           </a:xfrm>
@@ -3349,7 +3826,7 @@
           </a:bodyPr>
           <a:lstStyle/>
           <a:p>
-            <a:pPr marL="0" lvl="0" indent="0" algn="l" rtl="0">
+            <a:pPr marL="0" lvl="0" indent="0" algn="ctr" rtl="0">
               <a:spcBef>
                 <a:spcPts val="0"/>
               </a:spcBef>
@@ -3364,606 +3841,74 @@
               <a:buNone/>
             </a:pPr>
             <a:r>
-              <a:rPr lang="es-AR" dirty="0"/>
-              <a:t>E</a:t>
-            </a:r>
-            <a:r>
-              <a:rPr lang="es-AR" dirty="0" smtClean="0"/>
-              <a:t>jecución de test - Resultados</a:t>
+              <a:rPr lang="es-ES" dirty="0" smtClean="0"/>
+              <a:t>Reporte Final de Pruebas</a:t>
             </a:r>
             <a:endParaRPr dirty="0"/>
           </a:p>
         </p:txBody>
       </p:sp>
-      <p:sp>
-        <p:nvSpPr>
-          <p:cNvPr id="2" name="CuadroTexto 1"/>
-          <p:cNvSpPr txBox="1"/>
-          <p:nvPr/>
-        </p:nvSpPr>
-        <p:spPr>
-          <a:xfrm>
-            <a:off x="1975142" y="930011"/>
-            <a:ext cx="1140056" cy="307777"/>
-          </a:xfrm>
-          <a:prstGeom prst="rect">
-            <a:avLst/>
-          </a:prstGeom>
-          <a:noFill/>
-        </p:spPr>
-        <p:txBody>
-          <a:bodyPr wrap="none" rtlCol="0">
-            <a:spAutoFit/>
-          </a:bodyPr>
-          <a:lstStyle/>
-          <a:p>
-            <a:r>
-              <a:rPr lang="es-ES" dirty="0" err="1" smtClean="0"/>
-              <a:t>Smoke</a:t>
-            </a:r>
-            <a:r>
-              <a:rPr lang="es-ES" dirty="0" smtClean="0"/>
-              <a:t> Test</a:t>
-            </a:r>
-            <a:endParaRPr lang="en-US" dirty="0"/>
-          </a:p>
-        </p:txBody>
-      </p:sp>
-      <p:sp>
-        <p:nvSpPr>
-          <p:cNvPr id="6" name="CuadroTexto 5"/>
-          <p:cNvSpPr txBox="1"/>
-          <p:nvPr/>
-        </p:nvSpPr>
-        <p:spPr>
-          <a:xfrm>
-            <a:off x="5840334" y="987663"/>
-            <a:ext cx="1766830" cy="307777"/>
-          </a:xfrm>
-          <a:prstGeom prst="rect">
-            <a:avLst/>
-          </a:prstGeom>
-          <a:noFill/>
-        </p:spPr>
-        <p:txBody>
-          <a:bodyPr wrap="none" rtlCol="0">
-            <a:spAutoFit/>
-          </a:bodyPr>
-          <a:lstStyle/>
-          <a:p>
-            <a:r>
-              <a:rPr lang="es-ES" dirty="0" smtClean="0"/>
-              <a:t>Prueba Exploratoria</a:t>
-            </a:r>
-            <a:endParaRPr lang="en-US" dirty="0"/>
-          </a:p>
-        </p:txBody>
-      </p:sp>
-      <p:sp>
-        <p:nvSpPr>
-          <p:cNvPr id="8" name="CuadroTexto 7"/>
-          <p:cNvSpPr txBox="1"/>
-          <p:nvPr/>
-        </p:nvSpPr>
-        <p:spPr>
-          <a:xfrm>
-            <a:off x="1716257" y="2951208"/>
-            <a:ext cx="1657826" cy="307777"/>
-          </a:xfrm>
-          <a:prstGeom prst="rect">
-            <a:avLst/>
-          </a:prstGeom>
-          <a:noFill/>
-        </p:spPr>
-        <p:txBody>
-          <a:bodyPr wrap="none" rtlCol="0">
-            <a:spAutoFit/>
-          </a:bodyPr>
-          <a:lstStyle/>
-          <a:p>
-            <a:r>
-              <a:rPr lang="es-ES" dirty="0" smtClean="0"/>
-              <a:t>Pruebas Unitarias</a:t>
-            </a:r>
-            <a:endParaRPr lang="en-US" dirty="0"/>
-          </a:p>
-        </p:txBody>
-      </p:sp>
-      <p:sp>
-        <p:nvSpPr>
-          <p:cNvPr id="9" name="CuadroTexto 8"/>
-          <p:cNvSpPr txBox="1"/>
-          <p:nvPr/>
-        </p:nvSpPr>
-        <p:spPr>
-          <a:xfrm>
-            <a:off x="5840334" y="2951208"/>
-            <a:ext cx="1577676" cy="307777"/>
-          </a:xfrm>
-          <a:prstGeom prst="rect">
-            <a:avLst/>
-          </a:prstGeom>
-          <a:noFill/>
-        </p:spPr>
-        <p:txBody>
-          <a:bodyPr wrap="none" rtlCol="0">
-            <a:spAutoFit/>
-          </a:bodyPr>
-          <a:lstStyle/>
-          <a:p>
-            <a:r>
-              <a:rPr lang="es-ES" dirty="0" smtClean="0"/>
-              <a:t>Testeos </a:t>
-            </a:r>
-            <a:r>
-              <a:rPr lang="es-ES" dirty="0" err="1" smtClean="0"/>
-              <a:t>Postman</a:t>
-            </a:r>
-            <a:endParaRPr lang="en-US" dirty="0"/>
-          </a:p>
-        </p:txBody>
-      </p:sp>
-      <p:sp>
-        <p:nvSpPr>
-          <p:cNvPr id="14" name="CuadroTexto 13"/>
-          <p:cNvSpPr txBox="1"/>
-          <p:nvPr/>
-        </p:nvSpPr>
-        <p:spPr>
-          <a:xfrm>
-            <a:off x="715549" y="3436446"/>
-            <a:ext cx="3828315" cy="1600438"/>
-          </a:xfrm>
-          <a:prstGeom prst="rect">
-            <a:avLst/>
-          </a:prstGeom>
-          <a:noFill/>
-        </p:spPr>
-        <p:txBody>
-          <a:bodyPr wrap="square" rtlCol="0">
-            <a:spAutoFit/>
-          </a:bodyPr>
-          <a:lstStyle/>
-          <a:p>
-            <a:pPr marL="285750" indent="-285750">
-              <a:buFont typeface="Arial" panose="020B0604020202020204" pitchFamily="34" charset="0"/>
-              <a:buChar char="•"/>
-            </a:pPr>
-            <a:r>
-              <a:rPr lang="es-ES" dirty="0" smtClean="0"/>
-              <a:t>Test de Categoría </a:t>
-            </a:r>
-            <a:r>
-              <a:rPr lang="es-ES" dirty="0" err="1" smtClean="0"/>
-              <a:t>Controller</a:t>
-            </a:r>
-            <a:r>
-              <a:rPr lang="es-ES" dirty="0" smtClean="0"/>
-              <a:t> en JS </a:t>
-            </a:r>
-          </a:p>
-          <a:p>
-            <a:pPr marL="285750" indent="-285750">
-              <a:buFont typeface="Arial" panose="020B0604020202020204" pitchFamily="34" charset="0"/>
-              <a:buChar char="•"/>
-            </a:pPr>
-            <a:r>
-              <a:rPr lang="es-ES" dirty="0" smtClean="0"/>
-              <a:t>Test de Categoría </a:t>
-            </a:r>
-            <a:r>
-              <a:rPr lang="es-ES" dirty="0" err="1" smtClean="0"/>
-              <a:t>Service</a:t>
-            </a:r>
-            <a:endParaRPr lang="es-ES" dirty="0" smtClean="0"/>
-          </a:p>
-          <a:p>
-            <a:pPr marL="285750" indent="-285750">
-              <a:buFont typeface="Arial" panose="020B0604020202020204" pitchFamily="34" charset="0"/>
-              <a:buChar char="•"/>
-            </a:pPr>
-            <a:r>
-              <a:rPr lang="es-ES" dirty="0" smtClean="0"/>
-              <a:t>Métodos Listar, </a:t>
-            </a:r>
-            <a:r>
-              <a:rPr lang="es-ES" dirty="0" err="1" smtClean="0"/>
-              <a:t>Get</a:t>
-            </a:r>
-            <a:r>
-              <a:rPr lang="es-ES" dirty="0" smtClean="0"/>
-              <a:t> </a:t>
-            </a:r>
-            <a:r>
-              <a:rPr lang="es-ES" dirty="0" err="1" smtClean="0"/>
-              <a:t>by</a:t>
-            </a:r>
-            <a:r>
-              <a:rPr lang="es-ES" dirty="0" smtClean="0"/>
-              <a:t> Id, Post, </a:t>
-            </a:r>
-            <a:r>
-              <a:rPr lang="es-ES" dirty="0" err="1" smtClean="0"/>
-              <a:t>Put</a:t>
-            </a:r>
-            <a:r>
-              <a:rPr lang="es-ES" dirty="0" smtClean="0"/>
-              <a:t>, </a:t>
-            </a:r>
-            <a:r>
-              <a:rPr lang="es-ES" dirty="0" err="1" smtClean="0"/>
-              <a:t>Delete</a:t>
-            </a:r>
-            <a:endParaRPr lang="es-ES" dirty="0"/>
-          </a:p>
-          <a:p>
-            <a:pPr marL="285750" indent="-285750">
-              <a:buFont typeface="Arial" panose="020B0604020202020204" pitchFamily="34" charset="0"/>
-              <a:buChar char="•"/>
-            </a:pPr>
-            <a:r>
-              <a:rPr lang="es-ES" dirty="0" smtClean="0"/>
-              <a:t>Ambos Test </a:t>
-            </a:r>
-            <a:r>
-              <a:rPr lang="es-ES" dirty="0" err="1" smtClean="0"/>
-              <a:t>passed</a:t>
-            </a:r>
-            <a:r>
-              <a:rPr lang="es-ES" dirty="0" smtClean="0"/>
-              <a:t>.</a:t>
-            </a:r>
-          </a:p>
-          <a:p>
-            <a:pPr marL="285750" indent="-285750">
-              <a:buFontTx/>
-              <a:buChar char="-"/>
-            </a:pPr>
-            <a:endParaRPr lang="es-ES" dirty="0"/>
-          </a:p>
-          <a:p>
-            <a:pPr marL="285750" indent="-285750">
-              <a:buFontTx/>
-              <a:buChar char="-"/>
-            </a:pPr>
-            <a:endParaRPr lang="en-US" dirty="0"/>
-          </a:p>
-        </p:txBody>
-      </p:sp>
-      <p:sp>
-        <p:nvSpPr>
-          <p:cNvPr id="16" name="CuadroTexto 15"/>
-          <p:cNvSpPr txBox="1"/>
-          <p:nvPr/>
-        </p:nvSpPr>
-        <p:spPr>
-          <a:xfrm>
-            <a:off x="4715014" y="3436446"/>
-            <a:ext cx="3828315" cy="1815882"/>
-          </a:xfrm>
-          <a:prstGeom prst="rect">
-            <a:avLst/>
-          </a:prstGeom>
-          <a:noFill/>
-        </p:spPr>
-        <p:txBody>
-          <a:bodyPr wrap="square" rtlCol="0">
-            <a:spAutoFit/>
-          </a:bodyPr>
-          <a:lstStyle/>
-          <a:p>
-            <a:pPr marL="285750" indent="-285750">
-              <a:buFont typeface="Arial" panose="020B0604020202020204" pitchFamily="34" charset="0"/>
-              <a:buChar char="•"/>
-            </a:pPr>
-            <a:r>
-              <a:rPr lang="es-ES" dirty="0" smtClean="0"/>
-              <a:t>Test de la API</a:t>
-            </a:r>
-          </a:p>
-          <a:p>
-            <a:pPr marL="285750" indent="-285750">
-              <a:buFont typeface="Arial" panose="020B0604020202020204" pitchFamily="34" charset="0"/>
-              <a:buChar char="•"/>
-            </a:pPr>
-            <a:r>
-              <a:rPr lang="es-ES" dirty="0" smtClean="0"/>
-              <a:t>Métodos Post , </a:t>
-            </a:r>
-            <a:r>
-              <a:rPr lang="es-ES" dirty="0" err="1" smtClean="0"/>
-              <a:t>GetById</a:t>
-            </a:r>
-            <a:r>
-              <a:rPr lang="es-ES" dirty="0" smtClean="0"/>
-              <a:t> , </a:t>
-            </a:r>
-            <a:r>
-              <a:rPr lang="es-ES" dirty="0" err="1" smtClean="0"/>
-              <a:t>GetAll</a:t>
-            </a:r>
-            <a:r>
-              <a:rPr lang="es-ES" dirty="0" smtClean="0"/>
-              <a:t>,  </a:t>
-            </a:r>
-            <a:r>
-              <a:rPr lang="es-ES" dirty="0" err="1" smtClean="0"/>
-              <a:t>Put</a:t>
-            </a:r>
-            <a:r>
-              <a:rPr lang="es-ES" dirty="0" smtClean="0"/>
-              <a:t>, </a:t>
-            </a:r>
-            <a:r>
-              <a:rPr lang="es-ES" dirty="0" err="1" smtClean="0"/>
-              <a:t>Delete</a:t>
-            </a:r>
-            <a:endParaRPr lang="es-ES" dirty="0" smtClean="0"/>
-          </a:p>
-          <a:p>
-            <a:pPr marL="285750" indent="-285750">
-              <a:buFont typeface="Arial" panose="020B0604020202020204" pitchFamily="34" charset="0"/>
-              <a:buChar char="•"/>
-            </a:pPr>
-            <a:r>
-              <a:rPr lang="es-ES" dirty="0" smtClean="0"/>
-              <a:t>Verificación del </a:t>
-            </a:r>
-            <a:r>
-              <a:rPr lang="es-ES" dirty="0" err="1" smtClean="0"/>
-              <a:t>body</a:t>
-            </a:r>
-            <a:r>
-              <a:rPr lang="es-ES" dirty="0" smtClean="0"/>
-              <a:t> y validación con script.</a:t>
-            </a:r>
-            <a:endParaRPr lang="es-ES" dirty="0"/>
-          </a:p>
-          <a:p>
-            <a:pPr marL="285750" indent="-285750">
-              <a:buFont typeface="Arial" panose="020B0604020202020204" pitchFamily="34" charset="0"/>
-              <a:buChar char="•"/>
-            </a:pPr>
-            <a:r>
-              <a:rPr lang="es-ES" dirty="0" smtClean="0"/>
-              <a:t>100% ok</a:t>
-            </a:r>
-          </a:p>
-          <a:p>
-            <a:pPr marL="285750" indent="-285750">
-              <a:buFontTx/>
-              <a:buChar char="-"/>
-            </a:pPr>
-            <a:endParaRPr lang="es-ES" dirty="0"/>
-          </a:p>
-          <a:p>
-            <a:pPr marL="285750" indent="-285750">
-              <a:buFontTx/>
-              <a:buChar char="-"/>
-            </a:pPr>
-            <a:endParaRPr lang="en-US" dirty="0"/>
-          </a:p>
-        </p:txBody>
-      </p:sp>
-      <p:sp>
-        <p:nvSpPr>
-          <p:cNvPr id="17" name="CuadroTexto 16"/>
-          <p:cNvSpPr txBox="1"/>
-          <p:nvPr/>
-        </p:nvSpPr>
-        <p:spPr>
-          <a:xfrm>
-            <a:off x="715548" y="1443103"/>
-            <a:ext cx="3828315" cy="1384995"/>
-          </a:xfrm>
-          <a:prstGeom prst="rect">
-            <a:avLst/>
-          </a:prstGeom>
-          <a:noFill/>
-        </p:spPr>
-        <p:txBody>
-          <a:bodyPr wrap="square" rtlCol="0">
-            <a:spAutoFit/>
-          </a:bodyPr>
-          <a:lstStyle/>
-          <a:p>
-            <a:pPr marL="285750" indent="-285750">
-              <a:buFont typeface="Arial" panose="020B0604020202020204" pitchFamily="34" charset="0"/>
-              <a:buChar char="•"/>
-            </a:pPr>
-            <a:r>
-              <a:rPr lang="es-ES" dirty="0" smtClean="0"/>
-              <a:t>20 Test Planificados</a:t>
-            </a:r>
-          </a:p>
-          <a:p>
-            <a:pPr marL="285750" indent="-285750">
-              <a:buFont typeface="Arial" panose="020B0604020202020204" pitchFamily="34" charset="0"/>
-              <a:buChar char="•"/>
-            </a:pPr>
-            <a:r>
-              <a:rPr lang="es-ES" dirty="0" smtClean="0"/>
-              <a:t>1er Ciclo de Testeo realizado</a:t>
-            </a:r>
-          </a:p>
-          <a:p>
-            <a:pPr marL="285750" indent="-285750">
-              <a:buFont typeface="Arial" panose="020B0604020202020204" pitchFamily="34" charset="0"/>
-              <a:buChar char="•"/>
-            </a:pPr>
-            <a:r>
-              <a:rPr lang="es-ES" dirty="0" smtClean="0"/>
-              <a:t>20 Test Realizados</a:t>
-            </a:r>
-          </a:p>
-          <a:p>
-            <a:pPr marL="285750" indent="-285750">
-              <a:buFont typeface="Arial" panose="020B0604020202020204" pitchFamily="34" charset="0"/>
-              <a:buChar char="•"/>
-            </a:pPr>
-            <a:r>
-              <a:rPr lang="es-ES" dirty="0" err="1" smtClean="0"/>
-              <a:t>Xx</a:t>
-            </a:r>
-            <a:r>
-              <a:rPr lang="es-ES" dirty="0" smtClean="0"/>
-              <a:t> Test </a:t>
-            </a:r>
-            <a:r>
-              <a:rPr lang="es-ES" dirty="0" err="1" smtClean="0"/>
-              <a:t>Passed</a:t>
-            </a:r>
-            <a:endParaRPr lang="es-ES" dirty="0" smtClean="0"/>
-          </a:p>
-          <a:p>
-            <a:pPr marL="285750" indent="-285750">
-              <a:buFont typeface="Arial" panose="020B0604020202020204" pitchFamily="34" charset="0"/>
-              <a:buChar char="•"/>
-            </a:pPr>
-            <a:r>
-              <a:rPr lang="es-ES" dirty="0" err="1" smtClean="0"/>
-              <a:t>Xx</a:t>
-            </a:r>
-            <a:r>
-              <a:rPr lang="es-ES" dirty="0" smtClean="0"/>
-              <a:t> Test </a:t>
-            </a:r>
-            <a:r>
-              <a:rPr lang="es-ES" dirty="0" err="1" smtClean="0"/>
-              <a:t>Fail</a:t>
-            </a:r>
-            <a:endParaRPr lang="es-ES" dirty="0" smtClean="0"/>
-          </a:p>
-          <a:p>
-            <a:pPr marL="285750" indent="-285750">
-              <a:buFont typeface="Arial" panose="020B0604020202020204" pitchFamily="34" charset="0"/>
-              <a:buChar char="•"/>
-            </a:pPr>
-            <a:r>
-              <a:rPr lang="es-ES" dirty="0" err="1" smtClean="0"/>
-              <a:t>Yy</a:t>
-            </a:r>
-            <a:r>
-              <a:rPr lang="es-ES" dirty="0" smtClean="0"/>
-              <a:t> Defectos identificados.</a:t>
-            </a:r>
-            <a:endParaRPr lang="en-US" dirty="0"/>
-          </a:p>
-        </p:txBody>
-      </p:sp>
-      <p:sp>
-        <p:nvSpPr>
-          <p:cNvPr id="18" name="CuadroTexto 17"/>
-          <p:cNvSpPr txBox="1"/>
-          <p:nvPr/>
-        </p:nvSpPr>
-        <p:spPr>
-          <a:xfrm>
-            <a:off x="4715013" y="1443103"/>
-            <a:ext cx="3828315" cy="1815882"/>
-          </a:xfrm>
-          <a:prstGeom prst="rect">
-            <a:avLst/>
-          </a:prstGeom>
-          <a:noFill/>
-        </p:spPr>
-        <p:txBody>
-          <a:bodyPr wrap="square" rtlCol="0">
-            <a:spAutoFit/>
-          </a:bodyPr>
-          <a:lstStyle/>
-          <a:p>
-            <a:pPr marL="285750" indent="-285750">
-              <a:buFont typeface="Arial" panose="020B0604020202020204" pitchFamily="34" charset="0"/>
-              <a:buChar char="•"/>
-            </a:pPr>
-            <a:r>
-              <a:rPr lang="es-ES" dirty="0" smtClean="0"/>
-              <a:t>33 Pasos de prueba planificados</a:t>
-            </a:r>
-          </a:p>
-          <a:p>
-            <a:pPr marL="285750" indent="-285750">
-              <a:buFont typeface="Arial" panose="020B0604020202020204" pitchFamily="34" charset="0"/>
-              <a:buChar char="•"/>
-            </a:pPr>
-            <a:r>
-              <a:rPr lang="es-ES" dirty="0" smtClean="0"/>
-              <a:t>1 Ciclo de prueba realizado</a:t>
-            </a:r>
-          </a:p>
-          <a:p>
-            <a:pPr marL="285750" indent="-285750">
-              <a:buFont typeface="Arial" panose="020B0604020202020204" pitchFamily="34" charset="0"/>
-              <a:buChar char="•"/>
-            </a:pPr>
-            <a:r>
-              <a:rPr lang="es-ES" dirty="0" smtClean="0"/>
-              <a:t>33 pasos de prueba realizados</a:t>
-            </a:r>
-          </a:p>
-          <a:p>
-            <a:pPr marL="285750" indent="-285750">
-              <a:buFont typeface="Arial" panose="020B0604020202020204" pitchFamily="34" charset="0"/>
-              <a:buChar char="•"/>
-            </a:pPr>
-            <a:r>
-              <a:rPr lang="es-ES" dirty="0" err="1" smtClean="0"/>
-              <a:t>Xx</a:t>
-            </a:r>
-            <a:r>
-              <a:rPr lang="es-ES" dirty="0" smtClean="0"/>
-              <a:t> pasos ok</a:t>
-            </a:r>
-          </a:p>
-          <a:p>
-            <a:pPr marL="285750" indent="-285750">
-              <a:buFont typeface="Arial" panose="020B0604020202020204" pitchFamily="34" charset="0"/>
-              <a:buChar char="•"/>
-            </a:pPr>
-            <a:r>
-              <a:rPr lang="es-ES" dirty="0" err="1" smtClean="0"/>
-              <a:t>Xx</a:t>
-            </a:r>
-            <a:r>
-              <a:rPr lang="es-ES" dirty="0" smtClean="0"/>
-              <a:t> pasos con Error.</a:t>
-            </a:r>
-          </a:p>
-          <a:p>
-            <a:pPr marL="285750" indent="-285750">
-              <a:buFont typeface="Arial" panose="020B0604020202020204" pitchFamily="34" charset="0"/>
-              <a:buChar char="•"/>
-            </a:pPr>
-            <a:r>
-              <a:rPr lang="es-ES" dirty="0" err="1" smtClean="0"/>
-              <a:t>Yy</a:t>
-            </a:r>
-            <a:r>
-              <a:rPr lang="es-ES" dirty="0" smtClean="0"/>
-              <a:t> Defectos identificados</a:t>
-            </a:r>
-          </a:p>
-          <a:p>
-            <a:pPr marL="285750" indent="-285750">
-              <a:buFontTx/>
-              <a:buChar char="-"/>
-            </a:pPr>
-            <a:endParaRPr lang="es-ES" dirty="0"/>
-          </a:p>
-          <a:p>
-            <a:pPr marL="285750" indent="-285750">
-              <a:buFontTx/>
-              <a:buChar char="-"/>
-            </a:pPr>
-            <a:endParaRPr lang="en-US" dirty="0"/>
-          </a:p>
-        </p:txBody>
-      </p:sp>
+      <p:graphicFrame>
+        <p:nvGraphicFramePr>
+          <p:cNvPr id="2" name="Objeto 1"/>
+          <p:cNvGraphicFramePr>
+            <a:graphicFrameLocks noChangeAspect="1"/>
+          </p:cNvGraphicFramePr>
+          <p:nvPr>
+            <p:extLst>
+              <p:ext uri="{D42A27DB-BD31-4B8C-83A1-F6EECF244321}">
+                <p14:modId xmlns:p14="http://schemas.microsoft.com/office/powerpoint/2010/main" val="1909829546"/>
+              </p:ext>
+            </p:extLst>
+          </p:nvPr>
+        </p:nvGraphicFramePr>
+        <p:xfrm>
+          <a:off x="1485900" y="1262063"/>
+          <a:ext cx="6172200" cy="2619375"/>
+        </p:xfrm>
+        <a:graphic>
+          <a:graphicData uri="http://schemas.openxmlformats.org/presentationml/2006/ole">
+            <mc:AlternateContent xmlns:mc="http://schemas.openxmlformats.org/markup-compatibility/2006">
+              <mc:Choice xmlns:v="urn:schemas-microsoft-com:vml" Requires="v">
+                <p:oleObj spid="_x0000_s1031" name="Hoja de cálculo" r:id="rId4" imgW="6172322" imgH="2619178" progId="Excel.Sheet.12">
+                  <p:embed/>
+                </p:oleObj>
+              </mc:Choice>
+              <mc:Fallback>
+                <p:oleObj name="Hoja de cálculo" r:id="rId4" imgW="6172322" imgH="2619178" progId="Excel.Sheet.12">
+                  <p:embed/>
+                  <p:pic>
+                    <p:nvPicPr>
+                      <p:cNvPr id="0" name=""/>
+                      <p:cNvPicPr/>
+                      <p:nvPr/>
+                    </p:nvPicPr>
+                    <p:blipFill>
+                      <a:blip r:embed="rId5"/>
+                      <a:stretch>
+                        <a:fillRect/>
+                      </a:stretch>
+                    </p:blipFill>
+                    <p:spPr>
+                      <a:xfrm>
+                        <a:off x="1485900" y="1262063"/>
+                        <a:ext cx="6172200" cy="2619375"/>
+                      </a:xfrm>
+                      <a:prstGeom prst="rect">
+                        <a:avLst/>
+                      </a:prstGeom>
+                    </p:spPr>
+                  </p:pic>
+                </p:oleObj>
+              </mc:Fallback>
+            </mc:AlternateContent>
+          </a:graphicData>
+        </a:graphic>
+      </p:graphicFrame>
     </p:spTree>
     <p:extLst>
       <p:ext uri="{BB962C8B-B14F-4D97-AF65-F5344CB8AC3E}">
-        <p14:creationId xmlns:p14="http://schemas.microsoft.com/office/powerpoint/2010/main" val="2466202414"/>
+        <p14:creationId xmlns:p14="http://schemas.microsoft.com/office/powerpoint/2010/main" val="103656284"/>
       </p:ext>
     </p:extLst>
   </p:cSld>

</xml_diff>